<commit_message>
Added the poster and a normalized all image
</commit_message>
<xml_diff>
--- a/Poster1.pptx
+++ b/Poster1.pptx
@@ -3636,8 +3636,8 @@
         </p:nvSpPr>
         <p:spPr>
           <a:xfrm>
-            <a:off x="145281" y="188640"/>
-            <a:ext cx="4591695" cy="2443457"/>
+            <a:off x="302948" y="188640"/>
+            <a:ext cx="4068405" cy="2566568"/>
           </a:xfrm>
           <a:prstGeom prst="rect">
             <a:avLst/>
@@ -3658,27 +3658,27 @@
           </a:p>
           <a:p>
             <a:r>
-              <a:rPr lang="nl-NL" sz="1400" dirty="0" smtClean="0"/>
+              <a:rPr lang="nl-NL" sz="1600" dirty="0" smtClean="0"/>
               <a:t>Wij hebben de opdracht gekregen om </a:t>
             </a:r>
             <a:r>
-              <a:rPr lang="nl-NL" sz="1400" dirty="0" smtClean="0"/>
+              <a:rPr lang="nl-NL" sz="1600" dirty="0" smtClean="0"/>
               <a:t>met behulp van beeldverwerking een </a:t>
             </a:r>
             <a:r>
-              <a:rPr lang="nl-NL" sz="1400" dirty="0" smtClean="0"/>
+              <a:rPr lang="nl-NL" sz="1600" dirty="0" smtClean="0"/>
               <a:t>programma te maken dat kentekenplaatnummers herkent. Dit programma wordt gemaakt met </a:t>
             </a:r>
             <a:r>
-              <a:rPr lang="nl-NL" sz="1400" dirty="0" err="1" smtClean="0"/>
+              <a:rPr lang="nl-NL" sz="1600" dirty="0" err="1" smtClean="0"/>
               <a:t>matlab</a:t>
             </a:r>
             <a:r>
-              <a:rPr lang="nl-NL" sz="1400" dirty="0" smtClean="0"/>
+              <a:rPr lang="nl-NL" sz="1600" dirty="0" smtClean="0"/>
               <a:t> en zal o.a. gebruik maken van segmentatie</a:t>
             </a:r>
             <a:r>
-              <a:rPr lang="nl-NL" sz="1800" dirty="0" smtClean="0"/>
+              <a:rPr lang="nl-NL" dirty="0" smtClean="0"/>
               <a:t>. </a:t>
             </a:r>
           </a:p>
@@ -3701,8 +3701,8 @@
         </p:nvSpPr>
         <p:spPr>
           <a:xfrm>
-            <a:off x="175765" y="2132856"/>
-            <a:ext cx="4417195" cy="2720456"/>
+            <a:off x="4215172" y="4133006"/>
+            <a:ext cx="4417195" cy="566020"/>
           </a:xfrm>
           <a:prstGeom prst="rect">
             <a:avLst/>
@@ -3724,23 +3724,7 @@
             </a:br>
             <a:r>
               <a:rPr lang="nl-NL" sz="1400" dirty="0" smtClean="0"/>
-              <a:t>Om te segmenteren hebben we </a:t>
-            </a:r>
-            <a:r>
-              <a:rPr lang="nl-NL" sz="1400" dirty="0" err="1" smtClean="0"/>
-              <a:t>ColorThresholder</a:t>
-            </a:r>
-            <a:r>
-              <a:rPr lang="nl-NL" sz="1400" dirty="0" smtClean="0"/>
-              <a:t> gebruikt. Dit </a:t>
-            </a:r>
-            <a:r>
-              <a:rPr lang="nl-NL" sz="1400" dirty="0" err="1" smtClean="0"/>
-              <a:t>command</a:t>
-            </a:r>
-            <a:r>
-              <a:rPr lang="nl-NL" sz="1400" dirty="0" smtClean="0"/>
-              <a:t> opent een nieuw scherm (zoals in afbeelding 2 te zien is) waarin je een plaatje kunt inlezen en dan kunt schuiven met de RGB waarden die je wilt laten zien. We begonnen met het inlezen van één frame om van daaruit het filter te maken maar dit werkte niet optimaal. We hebben er daarom voor gekozen om meerdere frames bij elkaar te plakken om zo beter te kunnen zien welke RGB waarden bij de gele nummerplaat horen. Het oorspronkelijke beeld (de frames dus) worden genormaliseerd zodat het filter optimaal werkt. </a:t>
+              <a:t>We segmenteren </a:t>
             </a:r>
             <a:endParaRPr lang="nl-NL" sz="1400" b="1" dirty="0"/>
           </a:p>
@@ -3835,9 +3819,252 @@
           </a:extLst>
         </p:spPr>
       </p:pic>
+      <p:sp>
+        <p:nvSpPr>
+          <p:cNvPr id="5" name="Tekstvak 4"/>
+          <p:cNvSpPr txBox="1"/>
+          <p:nvPr/>
+        </p:nvSpPr>
+        <p:spPr>
+          <a:xfrm>
+            <a:off x="4649724" y="2999922"/>
+            <a:ext cx="1455403" cy="523220"/>
+          </a:xfrm>
+          <a:prstGeom prst="rect">
+            <a:avLst/>
+          </a:prstGeom>
+          <a:noFill/>
+        </p:spPr>
+        <p:txBody>
+          <a:bodyPr wrap="square" rtlCol="0">
+            <a:spAutoFit/>
+          </a:bodyPr>
+          <a:lstStyle/>
+          <a:p>
+            <a:r>
+              <a:rPr lang="nl-NL" sz="1400" i="1" dirty="0" smtClean="0"/>
+              <a:t>Afbeelding 1: </a:t>
+            </a:r>
+            <a:r>
+              <a:rPr lang="nl-NL" sz="1400" i="1" dirty="0" smtClean="0"/>
+              <a:t/>
+            </a:r>
+            <a:br>
+              <a:rPr lang="nl-NL" sz="1400" i="1" dirty="0" smtClean="0"/>
+            </a:br>
+            <a:r>
+              <a:rPr lang="nl-NL" sz="1400" i="1" dirty="0" smtClean="0"/>
+              <a:t>de </a:t>
+            </a:r>
+            <a:r>
+              <a:rPr lang="nl-NL" sz="1400" i="1" dirty="0" smtClean="0"/>
+              <a:t>GUI</a:t>
+            </a:r>
+            <a:endParaRPr lang="nl-NL" i="1" dirty="0"/>
+          </a:p>
+        </p:txBody>
+      </p:sp>
+      <p:sp>
+        <p:nvSpPr>
+          <p:cNvPr id="13" name="Tekstvak 12"/>
+          <p:cNvSpPr txBox="1"/>
+          <p:nvPr/>
+        </p:nvSpPr>
+        <p:spPr>
+          <a:xfrm>
+            <a:off x="390200" y="5589240"/>
+            <a:ext cx="4746208" cy="523220"/>
+          </a:xfrm>
+          <a:prstGeom prst="rect">
+            <a:avLst/>
+          </a:prstGeom>
+          <a:noFill/>
+        </p:spPr>
+        <p:txBody>
+          <a:bodyPr wrap="square" rtlCol="0">
+            <a:spAutoFit/>
+          </a:bodyPr>
+          <a:lstStyle/>
+          <a:p>
+            <a:r>
+              <a:rPr lang="nl-NL" sz="1400" i="1" dirty="0" smtClean="0"/>
+              <a:t>Afbeelding 2: </a:t>
+            </a:r>
+            <a:br>
+              <a:rPr lang="nl-NL" sz="1400" i="1" dirty="0" smtClean="0"/>
+            </a:br>
+            <a:r>
+              <a:rPr lang="nl-NL" sz="1400" i="1" dirty="0" err="1" smtClean="0"/>
+              <a:t>ColorThresholder</a:t>
+            </a:r>
+            <a:endParaRPr lang="nl-NL" i="1" dirty="0"/>
+          </a:p>
+        </p:txBody>
+      </p:sp>
+      <p:cxnSp>
+        <p:nvCxnSpPr>
+          <p:cNvPr id="4" name="Rechte verbindingslijn met pijl 3"/>
+          <p:cNvCxnSpPr/>
+          <p:nvPr/>
+        </p:nvCxnSpPr>
+        <p:spPr>
+          <a:xfrm flipV="1">
+            <a:off x="6892350" y="2820724"/>
+            <a:ext cx="135608" cy="354892"/>
+          </a:xfrm>
+          <a:prstGeom prst="straightConnector1">
+            <a:avLst/>
+          </a:prstGeom>
+          <a:ln>
+            <a:tailEnd type="arrow"/>
+          </a:ln>
+        </p:spPr>
+        <p:style>
+          <a:lnRef idx="1">
+            <a:schemeClr val="accent1"/>
+          </a:lnRef>
+          <a:fillRef idx="0">
+            <a:schemeClr val="accent1"/>
+          </a:fillRef>
+          <a:effectRef idx="0">
+            <a:schemeClr val="accent1"/>
+          </a:effectRef>
+          <a:fontRef idx="minor">
+            <a:schemeClr val="tx1"/>
+          </a:fontRef>
+        </p:style>
+      </p:cxnSp>
+      <p:sp>
+        <p:nvSpPr>
+          <p:cNvPr id="9" name="Tekstvak 8"/>
+          <p:cNvSpPr txBox="1"/>
+          <p:nvPr/>
+        </p:nvSpPr>
+        <p:spPr>
+          <a:xfrm>
+            <a:off x="6403851" y="3199172"/>
+            <a:ext cx="874014" cy="461665"/>
+          </a:xfrm>
+          <a:prstGeom prst="rect">
+            <a:avLst/>
+          </a:prstGeom>
+          <a:noFill/>
+        </p:spPr>
+        <p:txBody>
+          <a:bodyPr wrap="square" rtlCol="0">
+            <a:spAutoFit/>
+          </a:bodyPr>
+          <a:lstStyle/>
+          <a:p>
+            <a:pPr algn="ctr"/>
+            <a:r>
+              <a:rPr lang="nl-NL" sz="1200" dirty="0" smtClean="0"/>
+              <a:t>Starten +pauzeren</a:t>
+            </a:r>
+            <a:endParaRPr lang="nl-NL" sz="1200" dirty="0"/>
+          </a:p>
+        </p:txBody>
+      </p:sp>
+      <p:cxnSp>
+        <p:nvCxnSpPr>
+          <p:cNvPr id="14" name="Rechte verbindingslijn met pijl 13"/>
+          <p:cNvCxnSpPr/>
+          <p:nvPr/>
+        </p:nvCxnSpPr>
+        <p:spPr>
+          <a:xfrm flipH="1" flipV="1">
+            <a:off x="7337230" y="2832742"/>
+            <a:ext cx="136050" cy="399920"/>
+          </a:xfrm>
+          <a:prstGeom prst="straightConnector1">
+            <a:avLst/>
+          </a:prstGeom>
+          <a:ln>
+            <a:tailEnd type="arrow"/>
+          </a:ln>
+        </p:spPr>
+        <p:style>
+          <a:lnRef idx="1">
+            <a:schemeClr val="accent1"/>
+          </a:lnRef>
+          <a:fillRef idx="0">
+            <a:schemeClr val="accent1"/>
+          </a:fillRef>
+          <a:effectRef idx="0">
+            <a:schemeClr val="accent1"/>
+          </a:effectRef>
+          <a:fontRef idx="minor">
+            <a:schemeClr val="tx1"/>
+          </a:fontRef>
+        </p:style>
+      </p:cxnSp>
+      <p:sp>
+        <p:nvSpPr>
+          <p:cNvPr id="17" name="Tekstvak 16"/>
+          <p:cNvSpPr txBox="1"/>
+          <p:nvPr/>
+        </p:nvSpPr>
+        <p:spPr>
+          <a:xfrm>
+            <a:off x="7129018" y="3215687"/>
+            <a:ext cx="874014" cy="461665"/>
+          </a:xfrm>
+          <a:prstGeom prst="rect">
+            <a:avLst/>
+          </a:prstGeom>
+          <a:noFill/>
+        </p:spPr>
+        <p:txBody>
+          <a:bodyPr wrap="square" rtlCol="0">
+            <a:spAutoFit/>
+          </a:bodyPr>
+          <a:lstStyle/>
+          <a:p>
+            <a:pPr algn="ctr"/>
+            <a:r>
+              <a:rPr lang="nl-NL" sz="1200" dirty="0" smtClean="0"/>
+              <a:t>Next Frame</a:t>
+            </a:r>
+            <a:endParaRPr lang="nl-NL" sz="1200" dirty="0"/>
+          </a:p>
+        </p:txBody>
+      </p:sp>
+      <p:cxnSp>
+        <p:nvCxnSpPr>
+          <p:cNvPr id="19" name="Rechte verbindingslijn met pijl 18"/>
+          <p:cNvCxnSpPr/>
+          <p:nvPr/>
+        </p:nvCxnSpPr>
+        <p:spPr>
+          <a:xfrm flipH="1" flipV="1">
+            <a:off x="7714872" y="2844282"/>
+            <a:ext cx="288160" cy="388380"/>
+          </a:xfrm>
+          <a:prstGeom prst="straightConnector1">
+            <a:avLst/>
+          </a:prstGeom>
+          <a:ln>
+            <a:tailEnd type="arrow"/>
+          </a:ln>
+        </p:spPr>
+        <p:style>
+          <a:lnRef idx="1">
+            <a:schemeClr val="accent1"/>
+          </a:lnRef>
+          <a:fillRef idx="0">
+            <a:schemeClr val="accent1"/>
+          </a:fillRef>
+          <a:effectRef idx="0">
+            <a:schemeClr val="accent1"/>
+          </a:effectRef>
+          <a:fontRef idx="minor">
+            <a:schemeClr val="tx1"/>
+          </a:fontRef>
+        </p:style>
+      </p:cxnSp>
       <p:pic>
         <p:nvPicPr>
-          <p:cNvPr id="1028" name="Picture 4"/>
+          <p:cNvPr id="1026" name="Picture 2"/>
           <p:cNvPicPr>
             <a:picLocks noChangeAspect="1" noChangeArrowheads="1"/>
           </p:cNvPicPr>
@@ -3851,13 +4078,13 @@
               </a:ext>
             </a:extLst>
           </a:blip>
-          <a:srcRect l="187" t="1866" r="51328" b="20208"/>
+          <a:srcRect l="4015" t="3968" r="3507" b="4808"/>
           <a:stretch/>
         </p:blipFill>
         <p:spPr bwMode="auto">
           <a:xfrm>
-            <a:off x="3249477" y="4801192"/>
-            <a:ext cx="4357096" cy="2155451"/>
+            <a:off x="390200" y="3409300"/>
+            <a:ext cx="3630374" cy="2013431"/>
           </a:xfrm>
           <a:prstGeom prst="rect">
             <a:avLst/>
@@ -3889,14 +4116,14 @@
       </p:pic>
       <p:sp>
         <p:nvSpPr>
-          <p:cNvPr id="5" name="Tekstvak 4"/>
+          <p:cNvPr id="23" name="Tekstvak 22"/>
           <p:cNvSpPr txBox="1"/>
           <p:nvPr/>
         </p:nvSpPr>
         <p:spPr>
           <a:xfrm>
-            <a:off x="4755914" y="3021727"/>
-            <a:ext cx="4746208" cy="307777"/>
+            <a:off x="7780808" y="3232662"/>
+            <a:ext cx="874014" cy="461665"/>
           </a:xfrm>
           <a:prstGeom prst="rect">
             <a:avLst/>
@@ -3909,58 +4136,25 @@
           </a:bodyPr>
           <a:lstStyle/>
           <a:p>
-            <a:r>
-              <a:rPr lang="nl-NL" sz="1400" i="1" dirty="0" smtClean="0"/>
-              <a:t>Afbeelding 1: de GUI</a:t>
-            </a:r>
-            <a:endParaRPr lang="nl-NL" i="1" dirty="0"/>
-          </a:p>
-        </p:txBody>
-      </p:sp>
-      <p:sp>
-        <p:nvSpPr>
-          <p:cNvPr id="13" name="Tekstvak 12"/>
-          <p:cNvSpPr txBox="1"/>
-          <p:nvPr/>
-        </p:nvSpPr>
-        <p:spPr>
-          <a:xfrm>
-            <a:off x="5182102" y="6150284"/>
-            <a:ext cx="4746208" cy="307777"/>
-          </a:xfrm>
-          <a:prstGeom prst="rect">
-            <a:avLst/>
-          </a:prstGeom>
-          <a:noFill/>
-        </p:spPr>
-        <p:txBody>
-          <a:bodyPr wrap="square" rtlCol="0">
-            <a:spAutoFit/>
-          </a:bodyPr>
-          <a:lstStyle/>
-          <a:p>
-            <a:r>
-              <a:rPr lang="nl-NL" sz="1400" i="1" dirty="0" smtClean="0"/>
-              <a:t>Afbeelding 2: </a:t>
-            </a:r>
-            <a:r>
-              <a:rPr lang="nl-NL" sz="1400" i="1" dirty="0" err="1" smtClean="0"/>
-              <a:t>ColorThresholder</a:t>
-            </a:r>
-            <a:endParaRPr lang="nl-NL" i="1" dirty="0"/>
+            <a:pPr algn="ctr"/>
+            <a:r>
+              <a:rPr lang="nl-NL" sz="1200" dirty="0" smtClean="0"/>
+              <a:t>Load a video</a:t>
+            </a:r>
+            <a:endParaRPr lang="nl-NL" sz="1200" dirty="0"/>
           </a:p>
         </p:txBody>
       </p:sp>
       <p:cxnSp>
         <p:nvCxnSpPr>
-          <p:cNvPr id="4" name="Rechte verbindingslijn met pijl 3"/>
+          <p:cNvPr id="27" name="Rechte verbindingslijn met pijl 26"/>
           <p:cNvCxnSpPr/>
           <p:nvPr/>
         </p:nvCxnSpPr>
         <p:spPr>
           <a:xfrm flipV="1">
-            <a:off x="6960154" y="2820724"/>
-            <a:ext cx="135608" cy="354892"/>
+            <a:off x="4020574" y="2206082"/>
+            <a:ext cx="701558" cy="132322"/>
           </a:xfrm>
           <a:prstGeom prst="straightConnector1">
             <a:avLst/>
@@ -3986,14 +4180,14 @@
       </p:cxnSp>
       <p:sp>
         <p:nvSpPr>
-          <p:cNvPr id="9" name="Tekstvak 8"/>
+          <p:cNvPr id="29" name="Tekstvak 28"/>
           <p:cNvSpPr txBox="1"/>
           <p:nvPr/>
         </p:nvSpPr>
         <p:spPr>
           <a:xfrm>
-            <a:off x="6523147" y="3175616"/>
-            <a:ext cx="874014" cy="461665"/>
+            <a:off x="3220725" y="2356792"/>
+            <a:ext cx="1009842" cy="307777"/>
           </a:xfrm>
           <a:prstGeom prst="rect">
             <a:avLst/>
@@ -4007,23 +4201,23 @@
           <a:lstStyle/>
           <a:p>
             <a:r>
-              <a:rPr lang="nl-NL" sz="1200" dirty="0" smtClean="0"/>
-              <a:t>Starten +pauzeren</a:t>
-            </a:r>
-            <a:endParaRPr lang="nl-NL" sz="1200" dirty="0"/>
+              <a:rPr lang="nl-NL" sz="1400" i="1" dirty="0" smtClean="0"/>
+              <a:t>The video</a:t>
+            </a:r>
+            <a:endParaRPr lang="nl-NL" sz="1400" i="1" dirty="0"/>
           </a:p>
         </p:txBody>
       </p:sp>
       <p:cxnSp>
         <p:nvCxnSpPr>
-          <p:cNvPr id="14" name="Rechte verbindingslijn met pijl 13"/>
+          <p:cNvPr id="30" name="Rechte verbindingslijn met pijl 29"/>
           <p:cNvCxnSpPr/>
           <p:nvPr/>
         </p:nvCxnSpPr>
         <p:spPr>
-          <a:xfrm flipH="1" flipV="1">
-            <a:off x="7373651" y="2820724"/>
-            <a:ext cx="232922" cy="437006"/>
+          <a:xfrm>
+            <a:off x="6892350" y="1268760"/>
+            <a:ext cx="458621" cy="288032"/>
           </a:xfrm>
           <a:prstGeom prst="straightConnector1">
             <a:avLst/>
@@ -4049,14 +4243,14 @@
       </p:cxnSp>
       <p:sp>
         <p:nvSpPr>
-          <p:cNvPr id="16" name="Tekstvak 15"/>
+          <p:cNvPr id="32" name="Tekstvak 31"/>
           <p:cNvSpPr txBox="1"/>
           <p:nvPr/>
         </p:nvSpPr>
         <p:spPr>
           <a:xfrm>
-            <a:off x="7380648" y="3329504"/>
-            <a:ext cx="874014" cy="276999"/>
+            <a:off x="5995679" y="1053815"/>
+            <a:ext cx="2637214" cy="307777"/>
           </a:xfrm>
           <a:prstGeom prst="rect">
             <a:avLst/>
@@ -4069,10 +4263,286 @@
           </a:bodyPr>
           <a:lstStyle/>
           <a:p>
+            <a:r>
+              <a:rPr lang="nl-NL" sz="1400" i="1" dirty="0" err="1" smtClean="0"/>
+              <a:t>Segmented</a:t>
+            </a:r>
+            <a:r>
+              <a:rPr lang="nl-NL" sz="1400" i="1" dirty="0" smtClean="0"/>
+              <a:t> frame( </a:t>
+            </a:r>
+            <a:r>
+              <a:rPr lang="nl-NL" sz="1400" i="1" dirty="0" err="1" smtClean="0"/>
+              <a:t>for</a:t>
+            </a:r>
+            <a:r>
+              <a:rPr lang="nl-NL" sz="1400" i="1" dirty="0" smtClean="0"/>
+              <a:t> </a:t>
+            </a:r>
+            <a:r>
+              <a:rPr lang="nl-NL" sz="1400" i="1" dirty="0" err="1" smtClean="0"/>
+              <a:t>debugging</a:t>
+            </a:r>
+            <a:r>
+              <a:rPr lang="nl-NL" sz="1400" i="1" dirty="0" smtClean="0"/>
+              <a:t>)</a:t>
+            </a:r>
+            <a:endParaRPr lang="nl-NL" sz="1400" i="1" dirty="0"/>
+          </a:p>
+        </p:txBody>
+      </p:sp>
+      <p:sp>
+        <p:nvSpPr>
+          <p:cNvPr id="33" name="Tekstvak 32"/>
+          <p:cNvSpPr txBox="1"/>
+          <p:nvPr/>
+        </p:nvSpPr>
+        <p:spPr>
+          <a:xfrm>
+            <a:off x="8599249" y="3215687"/>
+            <a:ext cx="1046760" cy="1200329"/>
+          </a:xfrm>
+          <a:prstGeom prst="rect">
+            <a:avLst/>
+          </a:prstGeom>
+          <a:noFill/>
+        </p:spPr>
+        <p:txBody>
+          <a:bodyPr wrap="square" rtlCol="0">
+            <a:spAutoFit/>
+          </a:bodyPr>
+          <a:lstStyle/>
+          <a:p>
+            <a:pPr algn="ctr"/>
+            <a:r>
+              <a:rPr lang="nl-NL" sz="1200" dirty="0" err="1" smtClean="0"/>
+              <a:t>Table</a:t>
+            </a:r>
+            <a:r>
+              <a:rPr lang="nl-NL" sz="1200" dirty="0" smtClean="0"/>
+              <a:t> </a:t>
+            </a:r>
+            <a:r>
+              <a:rPr lang="nl-NL" sz="1200" dirty="0" err="1" smtClean="0"/>
+              <a:t>with</a:t>
+            </a:r>
+            <a:r>
+              <a:rPr lang="nl-NL" sz="1200" dirty="0" smtClean="0"/>
+              <a:t> </a:t>
+            </a:r>
+            <a:r>
+              <a:rPr lang="nl-NL" sz="1200" dirty="0" err="1" smtClean="0"/>
+              <a:t>the</a:t>
+            </a:r>
+            <a:r>
+              <a:rPr lang="nl-NL" sz="1200" dirty="0"/>
+              <a:t> </a:t>
+            </a:r>
+            <a:r>
+              <a:rPr lang="nl-NL" sz="1200" dirty="0" err="1" smtClean="0"/>
+              <a:t>plates</a:t>
+            </a:r>
+            <a:r>
+              <a:rPr lang="nl-NL" sz="1200" dirty="0" smtClean="0"/>
+              <a:t>, frame </a:t>
+            </a:r>
+            <a:r>
+              <a:rPr lang="nl-NL" sz="1200" dirty="0" err="1" smtClean="0"/>
+              <a:t>number</a:t>
+            </a:r>
+            <a:r>
+              <a:rPr lang="nl-NL" sz="1200" dirty="0" smtClean="0"/>
+              <a:t> </a:t>
+            </a:r>
+            <a:r>
+              <a:rPr lang="nl-NL" sz="1200" dirty="0" err="1" smtClean="0"/>
+              <a:t>and</a:t>
+            </a:r>
+            <a:r>
+              <a:rPr lang="nl-NL" sz="1200" dirty="0" smtClean="0"/>
+              <a:t> time of </a:t>
+            </a:r>
+            <a:r>
+              <a:rPr lang="nl-NL" sz="1200" dirty="0" err="1" smtClean="0"/>
+              <a:t>recognition</a:t>
+            </a:r>
             <a:endParaRPr lang="nl-NL" sz="1200" dirty="0"/>
           </a:p>
         </p:txBody>
       </p:sp>
+      <p:cxnSp>
+        <p:nvCxnSpPr>
+          <p:cNvPr id="34" name="Rechte verbindingslijn met pijl 33"/>
+          <p:cNvCxnSpPr>
+            <a:stCxn id="33" idx="0"/>
+          </p:cNvCxnSpPr>
+          <p:nvPr/>
+        </p:nvCxnSpPr>
+        <p:spPr>
+          <a:xfrm flipH="1" flipV="1">
+            <a:off x="8841368" y="2305586"/>
+            <a:ext cx="281261" cy="910101"/>
+          </a:xfrm>
+          <a:prstGeom prst="straightConnector1">
+            <a:avLst/>
+          </a:prstGeom>
+          <a:ln>
+            <a:tailEnd type="arrow"/>
+          </a:ln>
+        </p:spPr>
+        <p:style>
+          <a:lnRef idx="1">
+            <a:schemeClr val="accent1"/>
+          </a:lnRef>
+          <a:fillRef idx="0">
+            <a:schemeClr val="accent1"/>
+          </a:fillRef>
+          <a:effectRef idx="0">
+            <a:schemeClr val="accent1"/>
+          </a:effectRef>
+          <a:fontRef idx="minor">
+            <a:schemeClr val="tx1"/>
+          </a:fontRef>
+        </p:style>
+      </p:cxnSp>
+      <p:cxnSp>
+        <p:nvCxnSpPr>
+          <p:cNvPr id="38" name="Rechte verbindingslijn met pijl 37"/>
+          <p:cNvCxnSpPr>
+            <a:stCxn id="41" idx="2"/>
+          </p:cNvCxnSpPr>
+          <p:nvPr/>
+        </p:nvCxnSpPr>
+        <p:spPr>
+          <a:xfrm>
+            <a:off x="989440" y="3043905"/>
+            <a:ext cx="291152" cy="889151"/>
+          </a:xfrm>
+          <a:prstGeom prst="straightConnector1">
+            <a:avLst/>
+          </a:prstGeom>
+          <a:ln>
+            <a:tailEnd type="arrow"/>
+          </a:ln>
+        </p:spPr>
+        <p:style>
+          <a:lnRef idx="1">
+            <a:schemeClr val="accent1"/>
+          </a:lnRef>
+          <a:fillRef idx="0">
+            <a:schemeClr val="accent1"/>
+          </a:fillRef>
+          <a:effectRef idx="0">
+            <a:schemeClr val="accent1"/>
+          </a:effectRef>
+          <a:fontRef idx="minor">
+            <a:schemeClr val="tx1"/>
+          </a:fontRef>
+        </p:style>
+      </p:cxnSp>
+      <p:sp>
+        <p:nvSpPr>
+          <p:cNvPr id="41" name="Tekstvak 40"/>
+          <p:cNvSpPr txBox="1"/>
+          <p:nvPr/>
+        </p:nvSpPr>
+        <p:spPr>
+          <a:xfrm>
+            <a:off x="194231" y="2736128"/>
+            <a:ext cx="1590418" cy="307777"/>
+          </a:xfrm>
+          <a:prstGeom prst="rect">
+            <a:avLst/>
+          </a:prstGeom>
+          <a:noFill/>
+        </p:spPr>
+        <p:txBody>
+          <a:bodyPr wrap="square" rtlCol="0">
+            <a:spAutoFit/>
+          </a:bodyPr>
+          <a:lstStyle/>
+          <a:p>
+            <a:r>
+              <a:rPr lang="nl-NL" sz="1400" i="1" dirty="0" err="1" smtClean="0"/>
+              <a:t>Normalized</a:t>
+            </a:r>
+            <a:r>
+              <a:rPr lang="nl-NL" sz="1400" i="1" dirty="0" smtClean="0"/>
+              <a:t> frame</a:t>
+            </a:r>
+            <a:endParaRPr lang="nl-NL" i="1" dirty="0"/>
+          </a:p>
+        </p:txBody>
+      </p:sp>
+      <p:sp>
+        <p:nvSpPr>
+          <p:cNvPr id="44" name="Tekstvak 43"/>
+          <p:cNvSpPr txBox="1"/>
+          <p:nvPr/>
+        </p:nvSpPr>
+        <p:spPr>
+          <a:xfrm>
+            <a:off x="2286916" y="2755208"/>
+            <a:ext cx="1225924" cy="307777"/>
+          </a:xfrm>
+          <a:prstGeom prst="rect">
+            <a:avLst/>
+          </a:prstGeom>
+          <a:noFill/>
+        </p:spPr>
+        <p:txBody>
+          <a:bodyPr wrap="square" rtlCol="0">
+            <a:spAutoFit/>
+          </a:bodyPr>
+          <a:lstStyle/>
+          <a:p>
+            <a:r>
+              <a:rPr lang="nl-NL" sz="1400" i="1" dirty="0" smtClean="0"/>
+              <a:t>RGB </a:t>
+            </a:r>
+            <a:r>
+              <a:rPr lang="nl-NL" sz="1400" i="1" dirty="0" err="1" smtClean="0"/>
+              <a:t>values</a:t>
+            </a:r>
+            <a:endParaRPr lang="nl-NL" i="1" dirty="0"/>
+          </a:p>
+        </p:txBody>
+      </p:sp>
+      <p:cxnSp>
+        <p:nvCxnSpPr>
+          <p:cNvPr id="45" name="Rechte verbindingslijn met pijl 44"/>
+          <p:cNvCxnSpPr>
+            <a:stCxn id="44" idx="2"/>
+          </p:cNvCxnSpPr>
+          <p:nvPr/>
+        </p:nvCxnSpPr>
+        <p:spPr>
+          <a:xfrm>
+            <a:off x="2899878" y="3062985"/>
+            <a:ext cx="378057" cy="752866"/>
+          </a:xfrm>
+          <a:prstGeom prst="straightConnector1">
+            <a:avLst/>
+          </a:prstGeom>
+          <a:ln>
+            <a:tailEnd type="arrow"/>
+          </a:ln>
+        </p:spPr>
+        <p:style>
+          <a:lnRef idx="1">
+            <a:schemeClr val="accent1"/>
+          </a:lnRef>
+          <a:fillRef idx="0">
+            <a:schemeClr val="accent1"/>
+          </a:fillRef>
+          <a:effectRef idx="0">
+            <a:schemeClr val="accent1"/>
+          </a:effectRef>
+          <a:fontRef idx="minor">
+            <a:schemeClr val="tx1"/>
+          </a:fontRef>
+        </p:style>
+      </p:cxnSp>
     </p:spTree>
     <p:extLst>
       <p:ext uri="{BB962C8B-B14F-4D97-AF65-F5344CB8AC3E}">

</xml_diff>